<commit_message>
updated report and ppt
</commit_message>
<xml_diff>
--- a/AUDITDOC.pptx
+++ b/AUDITDOC.pptx
@@ -175,7 +175,7 @@
             <a:fld id="{1D8BD707-D9CF-40AE-B4C6-C98DA3205C09}" type="datetimeFigureOut">
               <a:rPr lang="en-US"/>
               <a:pPr/>
-              <a:t>2/17/2026</a:t>
+              <a:t>2/18/2026</a:t>
             </a:fld>
             <a:endParaRPr lang="en-US"/>
           </a:p>
@@ -355,7 +355,7 @@
             <a:fld id="{1D8BD707-D9CF-40AE-B4C6-C98DA3205C09}" type="datetimeFigureOut">
               <a:rPr lang="en-US"/>
               <a:pPr/>
-              <a:t>2/17/2026</a:t>
+              <a:t>2/18/2026</a:t>
             </a:fld>
             <a:endParaRPr lang="en-US"/>
           </a:p>
@@ -572,7 +572,7 @@
             <a:fld id="{1D8BD707-D9CF-40AE-B4C6-C98DA3205C09}" type="datetimeFigureOut">
               <a:rPr lang="en-US"/>
               <a:pPr/>
-              <a:t>2/17/2026</a:t>
+              <a:t>2/18/2026</a:t>
             </a:fld>
             <a:endParaRPr lang="en-US"/>
           </a:p>
@@ -723,7 +723,7 @@
             <a:fld id="{1D8BD707-D9CF-40AE-B4C6-C98DA3205C09}" type="datetimeFigureOut">
               <a:rPr lang="en-US"/>
               <a:pPr/>
-              <a:t>2/17/2026</a:t>
+              <a:t>2/18/2026</a:t>
             </a:fld>
             <a:endParaRPr lang="en-US"/>
           </a:p>
@@ -845,7 +845,7 @@
             <a:fld id="{1D8BD707-D9CF-40AE-B4C6-C98DA3205C09}" type="datetimeFigureOut">
               <a:rPr lang="en-US"/>
               <a:pPr/>
-              <a:t>2/17/2026</a:t>
+              <a:t>2/18/2026</a:t>
             </a:fld>
             <a:endParaRPr lang="en-US"/>
           </a:p>
@@ -1123,7 +1123,7 @@
             <a:fld id="{1D8BD707-D9CF-40AE-B4C6-C98DA3205C09}" type="datetimeFigureOut">
               <a:rPr lang="en-US"/>
               <a:pPr/>
-              <a:t>2/17/2026</a:t>
+              <a:t>2/18/2026</a:t>
             </a:fld>
             <a:endParaRPr lang="en-US"/>
           </a:p>
@@ -1522,7 +1522,7 @@
         </p:nvSpPr>
         <p:spPr>
           <a:xfrm>
-            <a:off x="1371600" y="2781300"/>
+            <a:off x="1295400" y="800100"/>
             <a:ext cx="15773400" cy="5690659"/>
           </a:xfrm>
           <a:prstGeom prst="rect">
@@ -1576,8 +1576,8 @@
         </p:nvSpPr>
         <p:spPr>
           <a:xfrm>
-            <a:off x="3581400" y="6795093"/>
-            <a:ext cx="10439400" cy="843821"/>
+            <a:off x="1295400" y="4914900"/>
+            <a:ext cx="10439400" cy="2531462"/>
           </a:xfrm>
           <a:prstGeom prst="rect">
             <a:avLst/>
@@ -1638,6 +1638,16 @@
               <a:t> </a:t>
             </a:r>
             <a:r>
+              <a:rPr lang="en-US" sz="5400" spc="-110" dirty="0" smtClean="0">
+                <a:solidFill>
+                  <a:srgbClr val="2F2F2F"/>
+                </a:solidFill>
+                <a:latin typeface="Trebuchet MS"/>
+                <a:cs typeface="Trebuchet MS"/>
+              </a:rPr>
+              <a:t>Team</a:t>
+            </a:r>
+            <a:r>
               <a:rPr sz="5400" dirty="0" smtClean="0">
                 <a:solidFill>
                   <a:srgbClr val="2F2F2F"/>
@@ -1666,6 +1676,93 @@
                 <a:cs typeface="Trebuchet MS"/>
               </a:rPr>
               <a:t>)</a:t>
+            </a:r>
+            <a:endParaRPr lang="en-US" sz="5400" spc="-10" dirty="0" smtClean="0">
+              <a:solidFill>
+                <a:srgbClr val="2F2F2F"/>
+              </a:solidFill>
+              <a:latin typeface="Trebuchet MS"/>
+              <a:cs typeface="Trebuchet MS"/>
+            </a:endParaRPr>
+          </a:p>
+          <a:p>
+            <a:pPr marL="12700">
+              <a:lnSpc>
+                <a:spcPct val="100000"/>
+              </a:lnSpc>
+              <a:spcBef>
+                <a:spcPts val="100"/>
+              </a:spcBef>
+            </a:pPr>
+            <a:r>
+              <a:rPr lang="en-US" sz="5400" spc="-10" dirty="0" smtClean="0">
+                <a:solidFill>
+                  <a:srgbClr val="2F2F2F"/>
+                </a:solidFill>
+                <a:latin typeface="Trebuchet MS"/>
+                <a:cs typeface="Trebuchet MS"/>
+              </a:rPr>
+              <a:t>1.Javed </a:t>
+            </a:r>
+            <a:r>
+              <a:rPr lang="en-US" sz="5400" spc="-10" dirty="0" err="1" smtClean="0">
+                <a:solidFill>
+                  <a:srgbClr val="2F2F2F"/>
+                </a:solidFill>
+                <a:latin typeface="Trebuchet MS"/>
+                <a:cs typeface="Trebuchet MS"/>
+              </a:rPr>
+              <a:t>Hussain</a:t>
+            </a:r>
+            <a:r>
+              <a:rPr lang="en-US" sz="5400" spc="-10" dirty="0" smtClean="0">
+                <a:solidFill>
+                  <a:srgbClr val="2F2F2F"/>
+                </a:solidFill>
+                <a:latin typeface="Trebuchet MS"/>
+                <a:cs typeface="Trebuchet MS"/>
+              </a:rPr>
+              <a:t>(10300323066)</a:t>
+            </a:r>
+          </a:p>
+          <a:p>
+            <a:pPr marL="12700">
+              <a:lnSpc>
+                <a:spcPct val="100000"/>
+              </a:lnSpc>
+              <a:spcBef>
+                <a:spcPts val="100"/>
+              </a:spcBef>
+            </a:pPr>
+            <a:r>
+              <a:rPr lang="en-US" sz="5400" spc="-10" dirty="0" smtClean="0">
+                <a:solidFill>
+                  <a:srgbClr val="2F2F2F"/>
+                </a:solidFill>
+                <a:latin typeface="Trebuchet MS"/>
+                <a:cs typeface="Trebuchet MS"/>
+              </a:rPr>
+              <a:t>2.Khushi </a:t>
+            </a:r>
+            <a:r>
+              <a:rPr lang="en-US" sz="5400" spc="-10" dirty="0" err="1" smtClean="0">
+                <a:solidFill>
+                  <a:srgbClr val="2F2F2F"/>
+                </a:solidFill>
+                <a:latin typeface="Trebuchet MS"/>
+                <a:cs typeface="Trebuchet MS"/>
+              </a:rPr>
+              <a:t>Kumari</a:t>
+            </a:r>
+            <a:r>
+              <a:rPr lang="en-US" sz="5400" spc="-10" dirty="0" smtClean="0">
+                <a:solidFill>
+                  <a:srgbClr val="2F2F2F"/>
+                </a:solidFill>
+                <a:latin typeface="Trebuchet MS"/>
+                <a:cs typeface="Trebuchet MS"/>
+              </a:rPr>
+              <a:t>(10300323068)</a:t>
             </a:r>
             <a:endParaRPr sz="5400" dirty="0">
               <a:latin typeface="Trebuchet MS"/>

</xml_diff>